<commit_message>
Mise à jour de la présentation PowerPoint
Ajout d'un sous-titre à la diapositive 1
Ajout de la session au pied de page
</commit_message>
<xml_diff>
--- a/gabarits/power_point/Présentation.pptx
+++ b/gabarits/power_point/Présentation.pptx
@@ -109,6 +109,11 @@
       </a:defRPr>
     </a:lvl9pPr>
   </p:defaultTextStyle>
+  <p:extLst>
+    <p:ext uri="{EFAFB233-063F-42B5-8137-9DF3F51BA10A}">
+      <p15:sldGuideLst xmlns:p15="http://schemas.microsoft.com/office/powerpoint/2012/main"/>
+    </p:ext>
+  </p:extLst>
 </p:presentation>
 </file>
 
@@ -194,7 +199,7 @@
           <a:p>
             <a:fld id="{1828E534-40D2-44D6-8FE1-56BF64978851}" type="datetimeFigureOut">
               <a:rPr lang="fr-FR" smtClean="0"/>
-              <a:t>24/04/2025</a:t>
+              <a:t>25/04/2025</a:t>
             </a:fld>
             <a:endParaRPr lang="fr-FR"/>
           </a:p>
@@ -352,7 +357,7 @@
           <a:p>
             <a:fld id="{A4F81FF1-DB2D-4C6D-9115-639311B5969D}" type="slidenum">
               <a:rPr lang="fr-FR" smtClean="0"/>
-              <a:t>‹N°›</a:t>
+              <a:t>‹n°›</a:t>
             </a:fld>
             <a:endParaRPr lang="fr-FR"/>
           </a:p>
@@ -608,7 +613,7 @@
           <a:p>
             <a:r>
               <a:rPr lang="fr-FR"/>
-              <a:t>420-XXX-MA</a:t>
+              <a:t>420-XXX-MA Hiver 2025</a:t>
             </a:r>
           </a:p>
         </p:txBody>
@@ -636,7 +641,7 @@
           <a:p>
             <a:fld id="{36376AB0-0692-48D0-BA24-F51617840AC6}" type="slidenum">
               <a:rPr lang="fr-FR" smtClean="0"/>
-              <a:t>‹N°›</a:t>
+              <a:t>‹n°›</a:t>
             </a:fld>
             <a:endParaRPr lang="fr-FR"/>
           </a:p>
@@ -870,7 +875,7 @@
           <a:p>
             <a:r>
               <a:rPr lang="fr-FR"/>
-              <a:t>420-XXX-MA</a:t>
+              <a:t>420-XXX-MA Hiver 2025</a:t>
             </a:r>
           </a:p>
         </p:txBody>
@@ -898,7 +903,7 @@
           <a:p>
             <a:fld id="{36376AB0-0692-48D0-BA24-F51617840AC6}" type="slidenum">
               <a:rPr lang="fr-FR" smtClean="0"/>
-              <a:t>‹N°›</a:t>
+              <a:t>‹n°›</a:t>
             </a:fld>
             <a:endParaRPr lang="fr-FR"/>
           </a:p>
@@ -1042,7 +1047,7 @@
           <a:p>
             <a:r>
               <a:rPr lang="fr-FR"/>
-              <a:t>420-XXX-MA</a:t>
+              <a:t>420-XXX-MA Hiver 2025</a:t>
             </a:r>
           </a:p>
         </p:txBody>
@@ -1070,7 +1075,7 @@
           <a:p>
             <a:fld id="{36376AB0-0692-48D0-BA24-F51617840AC6}" type="slidenum">
               <a:rPr lang="fr-FR" smtClean="0"/>
-              <a:t>‹N°›</a:t>
+              <a:t>‹n°›</a:t>
             </a:fld>
             <a:endParaRPr lang="fr-FR"/>
           </a:p>
@@ -1224,7 +1229,7 @@
           <a:p>
             <a:r>
               <a:rPr lang="fr-FR"/>
-              <a:t>420-XXX-MA</a:t>
+              <a:t>420-XXX-MA Hiver 2025</a:t>
             </a:r>
           </a:p>
         </p:txBody>
@@ -1252,7 +1257,7 @@
           <a:p>
             <a:fld id="{36376AB0-0692-48D0-BA24-F51617840AC6}" type="slidenum">
               <a:rPr lang="fr-FR" smtClean="0"/>
-              <a:t>‹N°›</a:t>
+              <a:t>‹n°›</a:t>
             </a:fld>
             <a:endParaRPr lang="fr-FR"/>
           </a:p>
@@ -1396,7 +1401,7 @@
           <a:p>
             <a:r>
               <a:rPr lang="fr-FR"/>
-              <a:t>420-XXX-MA</a:t>
+              <a:t>420-XXX-MA Hiver 2025</a:t>
             </a:r>
           </a:p>
         </p:txBody>
@@ -1424,7 +1429,7 @@
           <a:p>
             <a:fld id="{36376AB0-0692-48D0-BA24-F51617840AC6}" type="slidenum">
               <a:rPr lang="fr-FR" smtClean="0"/>
-              <a:t>‹N°›</a:t>
+              <a:t>‹n°›</a:t>
             </a:fld>
             <a:endParaRPr lang="fr-FR"/>
           </a:p>
@@ -1645,7 +1650,7 @@
           <a:p>
             <a:r>
               <a:rPr lang="fr-FR"/>
-              <a:t>420-XXX-MA</a:t>
+              <a:t>420-XXX-MA Hiver 2025</a:t>
             </a:r>
           </a:p>
         </p:txBody>
@@ -1673,7 +1678,7 @@
           <a:p>
             <a:fld id="{36376AB0-0692-48D0-BA24-F51617840AC6}" type="slidenum">
               <a:rPr lang="fr-FR" smtClean="0"/>
-              <a:t>‹N°›</a:t>
+              <a:t>‹n°›</a:t>
             </a:fld>
             <a:endParaRPr lang="fr-FR"/>
           </a:p>
@@ -1884,7 +1889,7 @@
           <a:p>
             <a:r>
               <a:rPr lang="fr-FR"/>
-              <a:t>420-XXX-MA</a:t>
+              <a:t>420-XXX-MA Hiver 2025</a:t>
             </a:r>
           </a:p>
         </p:txBody>
@@ -1912,7 +1917,7 @@
           <a:p>
             <a:fld id="{36376AB0-0692-48D0-BA24-F51617840AC6}" type="slidenum">
               <a:rPr lang="fr-FR" smtClean="0"/>
-              <a:t>‹N°›</a:t>
+              <a:t>‹n°›</a:t>
             </a:fld>
             <a:endParaRPr lang="fr-FR"/>
           </a:p>
@@ -2123,7 +2128,7 @@
           <a:p>
             <a:r>
               <a:rPr lang="fr-FR"/>
-              <a:t>420-XXX-MA</a:t>
+              <a:t>420-XXX-MA Hiver 2025</a:t>
             </a:r>
           </a:p>
         </p:txBody>
@@ -2151,7 +2156,7 @@
           <a:p>
             <a:fld id="{36376AB0-0692-48D0-BA24-F51617840AC6}" type="slidenum">
               <a:rPr lang="fr-FR" smtClean="0"/>
-              <a:t>‹N°›</a:t>
+              <a:t>‹n°›</a:t>
             </a:fld>
             <a:endParaRPr lang="fr-FR"/>
           </a:p>
@@ -2509,7 +2514,7 @@
           <a:p>
             <a:r>
               <a:rPr lang="fr-FR"/>
-              <a:t>420-XXX-MA</a:t>
+              <a:t>420-XXX-MA Hiver 2025</a:t>
             </a:r>
           </a:p>
         </p:txBody>
@@ -2537,7 +2542,7 @@
           <a:p>
             <a:fld id="{36376AB0-0692-48D0-BA24-F51617840AC6}" type="slidenum">
               <a:rPr lang="fr-FR" smtClean="0"/>
-              <a:t>‹N°›</a:t>
+              <a:t>‹n°›</a:t>
             </a:fld>
             <a:endParaRPr lang="fr-FR"/>
           </a:p>
@@ -2624,7 +2629,7 @@
           <a:p>
             <a:r>
               <a:rPr lang="fr-FR"/>
-              <a:t>420-XXX-MA</a:t>
+              <a:t>420-XXX-MA Hiver 2025</a:t>
             </a:r>
           </a:p>
         </p:txBody>
@@ -2652,7 +2657,7 @@
           <a:p>
             <a:fld id="{36376AB0-0692-48D0-BA24-F51617840AC6}" type="slidenum">
               <a:rPr lang="fr-FR" smtClean="0"/>
-              <a:t>‹N°›</a:t>
+              <a:t>‹n°›</a:t>
             </a:fld>
             <a:endParaRPr lang="fr-FR"/>
           </a:p>
@@ -2711,7 +2716,7 @@
           <a:p>
             <a:r>
               <a:rPr lang="fr-FR"/>
-              <a:t>420-XXX-MA</a:t>
+              <a:t>420-XXX-MA Hiver 2025</a:t>
             </a:r>
           </a:p>
         </p:txBody>
@@ -2739,7 +2744,7 @@
           <a:p>
             <a:fld id="{36376AB0-0692-48D0-BA24-F51617840AC6}" type="slidenum">
               <a:rPr lang="fr-FR" smtClean="0"/>
-              <a:t>‹N°›</a:t>
+              <a:t>‹n°›</a:t>
             </a:fld>
             <a:endParaRPr lang="fr-FR"/>
           </a:p>
@@ -2996,7 +3001,7 @@
           <a:p>
             <a:r>
               <a:rPr lang="fr-FR"/>
-              <a:t>420-XXX-MA</a:t>
+              <a:t>420-XXX-MA Hiver 2025</a:t>
             </a:r>
           </a:p>
         </p:txBody>
@@ -3024,7 +3029,7 @@
           <a:p>
             <a:fld id="{36376AB0-0692-48D0-BA24-F51617840AC6}" type="slidenum">
               <a:rPr lang="fr-FR" smtClean="0"/>
-              <a:t>‹N°›</a:t>
+              <a:t>‹n°›</a:t>
             </a:fld>
             <a:endParaRPr lang="fr-FR"/>
           </a:p>
@@ -3211,7 +3216,7 @@
           <a:p>
             <a:r>
               <a:rPr lang="fr-FR"/>
-              <a:t>420-XXX-MA</a:t>
+              <a:t>420-XXX-MA Hiver 2025</a:t>
             </a:r>
             <a:endParaRPr lang="fr-FR" dirty="0"/>
           </a:p>
@@ -3259,7 +3264,7 @@
             <a:fld id="{1F7ECF65-C199-4456-8CF6-A9A654BE2A6D}" type="slidenum">
               <a:rPr lang="fr-FR" smtClean="0"/>
               <a:pPr/>
-              <a:t>‹N°›</a:t>
+              <a:t>‹n°›</a:t>
             </a:fld>
             <a:endParaRPr lang="fr-FR" dirty="0"/>
           </a:p>
@@ -3742,16 +3747,40 @@
             <p:ph type="ctrTitle"/>
           </p:nvPr>
         </p:nvSpPr>
-        <p:spPr/>
-        <p:txBody>
-          <a:bodyPr/>
+        <p:spPr>
+          <a:xfrm>
+            <a:off x="1524000" y="2276041"/>
+            <a:ext cx="9144000" cy="1733715"/>
+          </a:xfrm>
+        </p:spPr>
+        <p:txBody>
+          <a:bodyPr anchor="ctr"/>
           <a:lstStyle/>
           <a:p>
             <a:r>
               <a:rPr lang="fr-CA" dirty="0"/>
               <a:t>Gabarit PowerPoint</a:t>
             </a:r>
-            <a:endParaRPr lang="fr-FR" dirty="0"/>
+            <a:br>
+              <a:rPr lang="fr-CA" dirty="0"/>
+            </a:br>
+            <a:r>
+              <a:rPr lang="fr-CA" sz="4800" dirty="0">
+                <a:solidFill>
+                  <a:schemeClr val="bg2">
+                    <a:lumMod val="50000"/>
+                  </a:schemeClr>
+                </a:solidFill>
+              </a:rPr>
+              <a:t>Sous-titre</a:t>
+            </a:r>
+            <a:endParaRPr lang="fr-FR" sz="4800" dirty="0">
+              <a:solidFill>
+                <a:schemeClr val="bg2">
+                  <a:lumMod val="50000"/>
+                </a:schemeClr>
+              </a:solidFill>
+            </a:endParaRPr>
           </a:p>
         </p:txBody>
       </p:sp>
@@ -3771,9 +3800,16 @@
             <p:ph type="subTitle" idx="1"/>
           </p:nvPr>
         </p:nvSpPr>
-        <p:spPr/>
-        <p:txBody>
-          <a:bodyPr/>
+        <p:spPr>
+          <a:xfrm>
+            <a:off x="1524000" y="4009756"/>
+            <a:ext cx="9144000" cy="383745"/>
+          </a:xfrm>
+        </p:spPr>
+        <p:txBody>
+          <a:bodyPr anchor="ctr">
+            <a:normAutofit fontScale="92500" lnSpcReduction="10000"/>
+          </a:bodyPr>
           <a:lstStyle/>
           <a:p>
             <a:r>
@@ -3784,31 +3820,6 @@
             </a:r>
             <a:endParaRPr lang="fr-CA" dirty="0"/>
           </a:p>
-          <a:p>
-            <a:r>
-              <a:rPr lang="fr-CA" dirty="0">
-                <a:solidFill>
-                  <a:schemeClr val="bg2">
-                    <a:lumMod val="25000"/>
-                  </a:schemeClr>
-                </a:solidFill>
-                <a:highlight>
-                  <a:srgbClr val="FFFF00"/>
-                </a:highlight>
-              </a:rPr>
-              <a:t>2025-04-24</a:t>
-            </a:r>
-            <a:endParaRPr lang="fr-FR" dirty="0">
-              <a:solidFill>
-                <a:schemeClr val="bg2">
-                  <a:lumMod val="25000"/>
-                </a:schemeClr>
-              </a:solidFill>
-              <a:highlight>
-                <a:srgbClr val="FFFF00"/>
-              </a:highlight>
-            </a:endParaRPr>
-          </a:p>
         </p:txBody>
       </p:sp>
       <p:sp>
@@ -3834,7 +3845,7 @@
           <a:p>
             <a:r>
               <a:rPr lang="fr-FR" dirty="0"/>
-              <a:t>420-XXX-MA</a:t>
+              <a:t>420-XXX-MA Hiver 2025</a:t>
             </a:r>
           </a:p>
         </p:txBody>
@@ -3997,7 +4008,7 @@
           <a:p>
             <a:r>
               <a:rPr lang="fr-FR"/>
-              <a:t>420-XXX-MA</a:t>
+              <a:t>420-XXX-MA Hiver 2025</a:t>
             </a:r>
           </a:p>
         </p:txBody>
@@ -4185,7 +4196,7 @@
           <a:p>
             <a:r>
               <a:rPr lang="fr-FR"/>
-              <a:t>420-XXX-MA</a:t>
+              <a:t>420-XXX-MA Hiver 2025</a:t>
             </a:r>
           </a:p>
         </p:txBody>
@@ -4240,6 +4251,9 @@
           <a:bodyPr/>
           <a:lstStyle/>
           <a:p>
+            <a:pPr marL="0" indent="0">
+              <a:buNone/>
+            </a:pPr>
             <a:r>
               <a:rPr lang="fr-CA" dirty="0"/>
               <a:t>Cette présentation est placée sous licence </a:t>

</xml_diff>